<commit_message>
I aparrently made changes
</commit_message>
<xml_diff>
--- a/presentation #2.pptx
+++ b/presentation #2.pptx
@@ -2,7 +2,7 @@
 <file path=ppt/presentation.xml><?xml version="1.0" encoding="utf-8"?>
 <p:presentation xmlns:a="http://schemas.openxmlformats.org/drawingml/2006/main" xmlns:r="http://schemas.openxmlformats.org/officeDocument/2006/relationships" xmlns:p="http://schemas.openxmlformats.org/presentationml/2006/main" saveSubsetFonts="1">
   <p:sldMasterIdLst>
-    <p:sldMasterId id="2147483660" r:id="rId1"/>
+    <p:sldMasterId id="2147483684" r:id="rId1"/>
   </p:sldMasterIdLst>
   <p:sldIdLst>
     <p:sldId id="256" r:id="rId2"/>
@@ -117,7 +117,7 @@
   </p:defaultTextStyle>
   <p:extLst>
     <p:ext uri="{EFAFB233-063F-42B5-8137-9DF3F51BA10A}">
-      <p15:sldGuideLst xmlns:p15="http://schemas.microsoft.com/office/powerpoint/2012/main">
+      <p15:sldGuideLst xmlns:p15="http://schemas.microsoft.com/office/powerpoint/2012/main" xmlns="">
         <p15:guide id="1" orient="horz" pos="2160">
           <p15:clr>
             <a:srgbClr val="A4A3A4"/>
@@ -246,7 +246,7 @@
             <a:fld id="{1D8BD707-D9CF-40AE-B4C6-C98DA3205C09}" type="datetimeFigureOut">
               <a:rPr lang="en-US" smtClean="0"/>
               <a:pPr/>
-              <a:t>4/16/2014</a:t>
+              <a:t>16.04.2014</a:t>
             </a:fld>
             <a:endParaRPr lang="en-US"/>
           </a:p>
@@ -474,7 +474,7 @@
             <a:fld id="{1D8BD707-D9CF-40AE-B4C6-C98DA3205C09}" type="datetimeFigureOut">
               <a:rPr lang="en-US" smtClean="0"/>
               <a:pPr/>
-              <a:t>4/16/2014</a:t>
+              <a:t>16.04.2014</a:t>
             </a:fld>
             <a:endParaRPr lang="en-US"/>
           </a:p>
@@ -651,7 +651,7 @@
             <a:fld id="{1D8BD707-D9CF-40AE-B4C6-C98DA3205C09}" type="datetimeFigureOut">
               <a:rPr lang="en-US" smtClean="0"/>
               <a:pPr/>
-              <a:t>4/16/2014</a:t>
+              <a:t>16.04.2014</a:t>
             </a:fld>
             <a:endParaRPr lang="en-US"/>
           </a:p>
@@ -818,7 +818,7 @@
             <a:fld id="{1D8BD707-D9CF-40AE-B4C6-C98DA3205C09}" type="datetimeFigureOut">
               <a:rPr lang="en-US" smtClean="0"/>
               <a:pPr/>
-              <a:t>4/16/2014</a:t>
+              <a:t>16.04.2014</a:t>
             </a:fld>
             <a:endParaRPr lang="en-US"/>
           </a:p>
@@ -1064,7 +1064,7 @@
             <a:fld id="{1D8BD707-D9CF-40AE-B4C6-C98DA3205C09}" type="datetimeFigureOut">
               <a:rPr lang="en-US" smtClean="0"/>
               <a:pPr/>
-              <a:t>4/16/2014</a:t>
+              <a:t>16.04.2014</a:t>
             </a:fld>
             <a:endParaRPr lang="en-US"/>
           </a:p>
@@ -1330,7 +1330,7 @@
             <a:fld id="{1D8BD707-D9CF-40AE-B4C6-C98DA3205C09}" type="datetimeFigureOut">
               <a:rPr lang="en-US" smtClean="0"/>
               <a:pPr/>
-              <a:t>4/16/2014</a:t>
+              <a:t>16.04.2014</a:t>
             </a:fld>
             <a:endParaRPr lang="en-US"/>
           </a:p>
@@ -1706,7 +1706,7 @@
             <a:fld id="{1D8BD707-D9CF-40AE-B4C6-C98DA3205C09}" type="datetimeFigureOut">
               <a:rPr lang="en-US" smtClean="0"/>
               <a:pPr/>
-              <a:t>4/16/2014</a:t>
+              <a:t>16.04.2014</a:t>
             </a:fld>
             <a:endParaRPr lang="en-US"/>
           </a:p>
@@ -1821,7 +1821,7 @@
             <a:fld id="{1D8BD707-D9CF-40AE-B4C6-C98DA3205C09}" type="datetimeFigureOut">
               <a:rPr lang="en-US" smtClean="0"/>
               <a:pPr/>
-              <a:t>4/16/2014</a:t>
+              <a:t>16.04.2014</a:t>
             </a:fld>
             <a:endParaRPr lang="en-US"/>
           </a:p>
@@ -1913,7 +1913,7 @@
             <a:fld id="{1D8BD707-D9CF-40AE-B4C6-C98DA3205C09}" type="datetimeFigureOut">
               <a:rPr lang="en-US" smtClean="0"/>
               <a:pPr/>
-              <a:t>4/16/2014</a:t>
+              <a:t>16.04.2014</a:t>
             </a:fld>
             <a:endParaRPr lang="en-US"/>
           </a:p>
@@ -2173,7 +2173,7 @@
             <a:fld id="{1D8BD707-D9CF-40AE-B4C6-C98DA3205C09}" type="datetimeFigureOut">
               <a:rPr lang="en-US" smtClean="0"/>
               <a:pPr/>
-              <a:t>4/16/2014</a:t>
+              <a:t>16.04.2014</a:t>
             </a:fld>
             <a:endParaRPr lang="en-US"/>
           </a:p>
@@ -2439,7 +2439,7 @@
             <a:fld id="{1D8BD707-D9CF-40AE-B4C6-C98DA3205C09}" type="datetimeFigureOut">
               <a:rPr lang="en-US" smtClean="0"/>
               <a:pPr/>
-              <a:t>4/16/2014</a:t>
+              <a:t>16.04.2014</a:t>
             </a:fld>
             <a:endParaRPr lang="en-US"/>
           </a:p>
@@ -2658,7 +2658,7 @@
             <a:fld id="{1D8BD707-D9CF-40AE-B4C6-C98DA3205C09}" type="datetimeFigureOut">
               <a:rPr lang="en-US" smtClean="0"/>
               <a:pPr/>
-              <a:t>4/16/2014</a:t>
+              <a:t>16.04.2014</a:t>
             </a:fld>
             <a:endParaRPr lang="en-US"/>
           </a:p>
@@ -2747,17 +2747,17 @@
   </p:cSld>
   <p:clrMap bg1="dk1" tx1="lt1" bg2="dk2" tx2="lt2" accent1="accent1" accent2="accent2" accent3="accent3" accent4="accent4" accent5="accent5" accent6="accent6" hlink="hlink" folHlink="folHlink"/>
   <p:sldLayoutIdLst>
-    <p:sldLayoutId id="2147483661" r:id="rId1"/>
-    <p:sldLayoutId id="2147483662" r:id="rId2"/>
-    <p:sldLayoutId id="2147483663" r:id="rId3"/>
-    <p:sldLayoutId id="2147483664" r:id="rId4"/>
-    <p:sldLayoutId id="2147483665" r:id="rId5"/>
-    <p:sldLayoutId id="2147483666" r:id="rId6"/>
-    <p:sldLayoutId id="2147483667" r:id="rId7"/>
-    <p:sldLayoutId id="2147483668" r:id="rId8"/>
-    <p:sldLayoutId id="2147483669" r:id="rId9"/>
-    <p:sldLayoutId id="2147483670" r:id="rId10"/>
-    <p:sldLayoutId id="2147483671" r:id="rId11"/>
+    <p:sldLayoutId id="2147483685" r:id="rId1"/>
+    <p:sldLayoutId id="2147483686" r:id="rId2"/>
+    <p:sldLayoutId id="2147483687" r:id="rId3"/>
+    <p:sldLayoutId id="2147483688" r:id="rId4"/>
+    <p:sldLayoutId id="2147483689" r:id="rId5"/>
+    <p:sldLayoutId id="2147483690" r:id="rId6"/>
+    <p:sldLayoutId id="2147483691" r:id="rId7"/>
+    <p:sldLayoutId id="2147483692" r:id="rId8"/>
+    <p:sldLayoutId id="2147483693" r:id="rId9"/>
+    <p:sldLayoutId id="2147483694" r:id="rId10"/>
+    <p:sldLayoutId id="2147483695" r:id="rId11"/>
   </p:sldLayoutIdLst>
   <p:txStyles>
     <p:titleStyle>
@@ -3251,6 +3251,14 @@
 <file path=ppt/slides/slide11.xml><?xml version="1.0" encoding="utf-8"?>
 <p:sld xmlns:a="http://schemas.openxmlformats.org/drawingml/2006/main" xmlns:r="http://schemas.openxmlformats.org/officeDocument/2006/relationships" xmlns:p="http://schemas.openxmlformats.org/presentationml/2006/main">
   <p:cSld>
+    <p:bg>
+      <p:bgPr>
+        <a:solidFill>
+          <a:schemeClr val="tx1"/>
+        </a:solidFill>
+        <a:effectLst/>
+      </p:bgPr>
+    </p:bg>
     <p:spTree>
       <p:nvGrpSpPr>
         <p:cNvPr id="1" name=""/>
@@ -3292,13 +3300,11 @@
       </p:sp>
       <p:pic>
         <p:nvPicPr>
-          <p:cNvPr id="1026" name="Picture 2"/>
+          <p:cNvPr id="1028" name="Picture 4" descr="http://us.cdn3.123rf.com/168nwm/piksel/piksel1302/piksel130200088/17934773-man-pointing-at-whiteboard.jpg"/>
           <p:cNvPicPr>
-            <a:picLocks noGrp="1" noChangeAspect="1" noChangeArrowheads="1"/>
+            <a:picLocks noChangeAspect="1" noChangeArrowheads="1"/>
           </p:cNvPicPr>
-          <p:nvPr>
-            <p:ph idx="1"/>
-          </p:nvPr>
+          <p:nvPr/>
         </p:nvPicPr>
         <p:blipFill>
           <a:blip r:embed="rId2" cstate="print"/>
@@ -3309,39 +3315,7 @@
         </p:blipFill>
         <p:spPr bwMode="auto">
           <a:xfrm>
-            <a:off x="1143000" y="1676400"/>
-            <a:ext cx="4532915" cy="4525963"/>
-          </a:xfrm>
-          <a:prstGeom prst="rect">
-            <a:avLst/>
-          </a:prstGeom>
-          <a:noFill/>
-          <a:ln w="9525">
-            <a:noFill/>
-            <a:miter lim="800000"/>
-            <a:headEnd/>
-            <a:tailEnd/>
-          </a:ln>
-        </p:spPr>
-      </p:pic>
-      <p:pic>
-        <p:nvPicPr>
-          <p:cNvPr id="1028" name="Picture 4" descr="http://us.cdn3.123rf.com/168nwm/piksel/piksel1302/piksel130200088/17934773-man-pointing-at-whiteboard.jpg"/>
-          <p:cNvPicPr>
-            <a:picLocks noChangeAspect="1" noChangeArrowheads="1"/>
-          </p:cNvPicPr>
-          <p:nvPr/>
-        </p:nvPicPr>
-        <p:blipFill>
-          <a:blip r:embed="rId3" cstate="print"/>
-          <a:srcRect/>
-          <a:stretch>
-            <a:fillRect/>
-          </a:stretch>
-        </p:blipFill>
-        <p:spPr bwMode="auto">
-          <a:xfrm>
-            <a:off x="5029200" y="1828800"/>
+            <a:off x="4953000" y="1828800"/>
             <a:ext cx="2816679" cy="4114800"/>
           </a:xfrm>
           <a:prstGeom prst="rect">
@@ -3350,86 +3324,6 @@
           <a:noFill/>
         </p:spPr>
       </p:pic>
-      <p:sp>
-        <p:nvSpPr>
-          <p:cNvPr id="7" name="Rectangle 6"/>
-          <p:cNvSpPr/>
-          <p:nvPr/>
-        </p:nvSpPr>
-        <p:spPr>
-          <a:xfrm>
-            <a:off x="5410200" y="1066800"/>
-            <a:ext cx="3733800" cy="838200"/>
-          </a:xfrm>
-          <a:prstGeom prst="rect">
-            <a:avLst/>
-          </a:prstGeom>
-        </p:spPr>
-        <p:style>
-          <a:lnRef idx="2">
-            <a:schemeClr val="accent1">
-              <a:shade val="50000"/>
-            </a:schemeClr>
-          </a:lnRef>
-          <a:fillRef idx="1">
-            <a:schemeClr val="accent1"/>
-          </a:fillRef>
-          <a:effectRef idx="0">
-            <a:schemeClr val="accent1"/>
-          </a:effectRef>
-          <a:fontRef idx="minor">
-            <a:schemeClr val="lt1"/>
-          </a:fontRef>
-        </p:style>
-        <p:txBody>
-          <a:bodyPr rtlCol="0" anchor="ctr"/>
-          <a:lstStyle/>
-          <a:p>
-            <a:pPr algn="ctr"/>
-            <a:endParaRPr lang="en-US"/>
-          </a:p>
-        </p:txBody>
-      </p:sp>
-      <p:sp>
-        <p:nvSpPr>
-          <p:cNvPr id="6" name="TextBox 5"/>
-          <p:cNvSpPr txBox="1"/>
-          <p:nvPr/>
-        </p:nvSpPr>
-        <p:spPr>
-          <a:xfrm>
-            <a:off x="5486400" y="1143000"/>
-            <a:ext cx="3288336" cy="646331"/>
-          </a:xfrm>
-          <a:prstGeom prst="rect">
-            <a:avLst/>
-          </a:prstGeom>
-          <a:noFill/>
-        </p:spPr>
-        <p:txBody>
-          <a:bodyPr wrap="none" rtlCol="0">
-            <a:spAutoFit/>
-          </a:bodyPr>
-          <a:lstStyle/>
-          <a:p>
-            <a:r>
-              <a:rPr lang="en-US" dirty="0" smtClean="0"/>
-              <a:t>HEY! That’s a graph of something</a:t>
-            </a:r>
-          </a:p>
-          <a:p>
-            <a:r>
-              <a:rPr lang="en-US" dirty="0" err="1" smtClean="0"/>
-              <a:t>kinda</a:t>
-            </a:r>
-            <a:r>
-              <a:rPr lang="en-US" dirty="0" smtClean="0"/>
-              <a:t> important!</a:t>
-            </a:r>
-            <a:endParaRPr lang="en-US" dirty="0"/>
-          </a:p>
-        </p:txBody>
-      </p:sp>
       <p:cxnSp>
         <p:nvCxnSpPr>
           <p:cNvPr id="9" name="Straight Arrow Connector 8"/>
@@ -3463,6 +3357,120 @@
           </a:fontRef>
         </p:style>
       </p:cxnSp>
+      <p:pic>
+        <p:nvPicPr>
+          <p:cNvPr id="1026" name="Picture 2"/>
+          <p:cNvPicPr>
+            <a:picLocks noGrp="1" noChangeAspect="1" noChangeArrowheads="1"/>
+          </p:cNvPicPr>
+          <p:nvPr>
+            <p:ph idx="1"/>
+          </p:nvPr>
+        </p:nvPicPr>
+        <p:blipFill>
+          <a:blip r:embed="rId3" cstate="print"/>
+          <a:srcRect/>
+          <a:stretch>
+            <a:fillRect/>
+          </a:stretch>
+        </p:blipFill>
+        <p:spPr bwMode="auto">
+          <a:xfrm>
+            <a:off x="1143000" y="1676400"/>
+            <a:ext cx="4532915" cy="4525963"/>
+          </a:xfrm>
+          <a:prstGeom prst="rect">
+            <a:avLst/>
+          </a:prstGeom>
+          <a:noFill/>
+          <a:ln w="9525">
+            <a:noFill/>
+            <a:miter lim="800000"/>
+            <a:headEnd/>
+            <a:tailEnd/>
+          </a:ln>
+        </p:spPr>
+      </p:pic>
+      <p:sp>
+        <p:nvSpPr>
+          <p:cNvPr id="7" name="Rectangle 6"/>
+          <p:cNvSpPr/>
+          <p:nvPr/>
+        </p:nvSpPr>
+        <p:spPr>
+          <a:xfrm>
+            <a:off x="5410200" y="1066800"/>
+            <a:ext cx="3733800" cy="838200"/>
+          </a:xfrm>
+          <a:prstGeom prst="rect">
+            <a:avLst/>
+          </a:prstGeom>
+        </p:spPr>
+        <p:style>
+          <a:lnRef idx="2">
+            <a:schemeClr val="accent1">
+              <a:shade val="50000"/>
+            </a:schemeClr>
+          </a:lnRef>
+          <a:fillRef idx="1">
+            <a:schemeClr val="accent1"/>
+          </a:fillRef>
+          <a:effectRef idx="0">
+            <a:schemeClr val="accent1"/>
+          </a:effectRef>
+          <a:fontRef idx="minor">
+            <a:schemeClr val="lt1"/>
+          </a:fontRef>
+        </p:style>
+        <p:txBody>
+          <a:bodyPr rtlCol="0" anchor="ctr"/>
+          <a:lstStyle/>
+          <a:p>
+            <a:pPr algn="ctr"/>
+            <a:endParaRPr lang="en-US"/>
+          </a:p>
+        </p:txBody>
+      </p:sp>
+      <p:sp>
+        <p:nvSpPr>
+          <p:cNvPr id="6" name="TextBox 5"/>
+          <p:cNvSpPr txBox="1"/>
+          <p:nvPr/>
+        </p:nvSpPr>
+        <p:spPr>
+          <a:xfrm>
+            <a:off x="5562600" y="1143000"/>
+            <a:ext cx="3288336" cy="646331"/>
+          </a:xfrm>
+          <a:prstGeom prst="rect">
+            <a:avLst/>
+          </a:prstGeom>
+          <a:noFill/>
+        </p:spPr>
+        <p:txBody>
+          <a:bodyPr wrap="none" rtlCol="0">
+            <a:spAutoFit/>
+          </a:bodyPr>
+          <a:lstStyle/>
+          <a:p>
+            <a:r>
+              <a:rPr lang="en-US" dirty="0" smtClean="0"/>
+              <a:t>HEY! That’s a graph of something</a:t>
+            </a:r>
+          </a:p>
+          <a:p>
+            <a:r>
+              <a:rPr lang="en-US" dirty="0" err="1" smtClean="0"/>
+              <a:t>kinda</a:t>
+            </a:r>
+            <a:r>
+              <a:rPr lang="en-US" dirty="0" smtClean="0"/>
+              <a:t> important!</a:t>
+            </a:r>
+            <a:endParaRPr lang="en-US" dirty="0"/>
+          </a:p>
+        </p:txBody>
+      </p:sp>
     </p:spTree>
   </p:cSld>
   <p:clrMapOvr>
@@ -4043,7 +4051,6 @@
               <a:rPr lang="en-GB" dirty="0"/>
               <a:t> </a:t>
             </a:r>
-            <a:endParaRPr lang="en-GB" dirty="0"/>
           </a:p>
           <a:p>
             <a:r>
@@ -4066,7 +4073,7 @@
     </p:spTree>
     <p:extLst>
       <p:ext uri="{BB962C8B-B14F-4D97-AF65-F5344CB8AC3E}">
-        <p14:creationId xmlns:p14="http://schemas.microsoft.com/office/powerpoint/2010/main" val="2099213764"/>
+        <p14:creationId xmlns:p14="http://schemas.microsoft.com/office/powerpoint/2010/main" xmlns="" val="2099213764"/>
       </p:ext>
     </p:extLst>
   </p:cSld>

</xml_diff>